<commit_message>
work on ppt, added cheat sheet
</commit_message>
<xml_diff>
--- a/GIT 101.pptx
+++ b/GIT 101.pptx
@@ -8,8 +8,8 @@
     <p:sldId id="256" r:id="rId2"/>
     <p:sldId id="257" r:id="rId3"/>
     <p:sldId id="259" r:id="rId4"/>
-    <p:sldId id="258" r:id="rId5"/>
-    <p:sldId id="260" r:id="rId6"/>
+    <p:sldId id="260" r:id="rId5"/>
+    <p:sldId id="258" r:id="rId6"/>
     <p:sldId id="261" r:id="rId7"/>
     <p:sldId id="262" r:id="rId8"/>
     <p:sldId id="263" r:id="rId9"/>
@@ -370,7 +370,7 @@
             <a:fld id="{B61BEF0D-F0BB-DE4B-95CE-6DB70DBA9567}" type="datetimeFigureOut">
               <a:rPr lang="en-US" dirty="0"/>
               <a:pPr/>
-              <a:t>9/29/2020</a:t>
+              <a:t>9/30/2020</a:t>
             </a:fld>
             <a:endParaRPr lang="en-US" dirty="0"/>
           </a:p>
@@ -701,7 +701,7 @@
             <a:fld id="{B61BEF0D-F0BB-DE4B-95CE-6DB70DBA9567}" type="datetimeFigureOut">
               <a:rPr lang="en-US" dirty="0"/>
               <a:pPr/>
-              <a:t>9/29/2020</a:t>
+              <a:t>9/30/2020</a:t>
             </a:fld>
             <a:endParaRPr lang="en-US" dirty="0"/>
           </a:p>
@@ -976,7 +976,7 @@
             <a:fld id="{B61BEF0D-F0BB-DE4B-95CE-6DB70DBA9567}" type="datetimeFigureOut">
               <a:rPr lang="en-US" dirty="0"/>
               <a:pPr/>
-              <a:t>9/29/2020</a:t>
+              <a:t>9/30/2020</a:t>
             </a:fld>
             <a:endParaRPr lang="en-US" dirty="0"/>
           </a:p>
@@ -1541,7 +1541,7 @@
             <a:fld id="{B61BEF0D-F0BB-DE4B-95CE-6DB70DBA9567}" type="datetimeFigureOut">
               <a:rPr lang="en-US" dirty="0"/>
               <a:pPr/>
-              <a:t>9/29/2020</a:t>
+              <a:t>9/30/2020</a:t>
             </a:fld>
             <a:endParaRPr lang="en-US" dirty="0"/>
           </a:p>
@@ -1816,7 +1816,7 @@
             <a:fld id="{B61BEF0D-F0BB-DE4B-95CE-6DB70DBA9567}" type="datetimeFigureOut">
               <a:rPr lang="en-US" dirty="0"/>
               <a:pPr/>
-              <a:t>9/29/2020</a:t>
+              <a:t>9/30/2020</a:t>
             </a:fld>
             <a:endParaRPr lang="en-US" dirty="0"/>
           </a:p>
@@ -2375,7 +2375,7 @@
             <a:fld id="{B61BEF0D-F0BB-DE4B-95CE-6DB70DBA9567}" type="datetimeFigureOut">
               <a:rPr lang="en-US" dirty="0"/>
               <a:pPr/>
-              <a:t>9/29/2020</a:t>
+              <a:t>9/30/2020</a:t>
             </a:fld>
             <a:endParaRPr lang="en-US" dirty="0"/>
           </a:p>
@@ -2699,7 +2699,7 @@
             <a:fld id="{B61BEF0D-F0BB-DE4B-95CE-6DB70DBA9567}" type="datetimeFigureOut">
               <a:rPr lang="en-US" dirty="0"/>
               <a:pPr/>
-              <a:t>9/29/2020</a:t>
+              <a:t>9/30/2020</a:t>
             </a:fld>
             <a:endParaRPr lang="en-US" dirty="0"/>
           </a:p>
@@ -2873,7 +2873,7 @@
             <a:fld id="{B61BEF0D-F0BB-DE4B-95CE-6DB70DBA9567}" type="datetimeFigureOut">
               <a:rPr lang="en-US" dirty="0"/>
               <a:pPr/>
-              <a:t>9/29/2020</a:t>
+              <a:t>9/30/2020</a:t>
             </a:fld>
             <a:endParaRPr lang="en-US" dirty="0"/>
           </a:p>
@@ -3108,7 +3108,7 @@
             <a:fld id="{B61BEF0D-F0BB-DE4B-95CE-6DB70DBA9567}" type="datetimeFigureOut">
               <a:rPr lang="en-US" dirty="0"/>
               <a:pPr/>
-              <a:t>9/29/2020</a:t>
+              <a:t>9/30/2020</a:t>
             </a:fld>
             <a:endParaRPr lang="en-US" dirty="0"/>
           </a:p>
@@ -3305,7 +3305,7 @@
             <a:fld id="{B61BEF0D-F0BB-DE4B-95CE-6DB70DBA9567}" type="datetimeFigureOut">
               <a:rPr lang="en-US" dirty="0"/>
               <a:pPr/>
-              <a:t>9/29/2020</a:t>
+              <a:t>9/30/2020</a:t>
             </a:fld>
             <a:endParaRPr lang="en-US" dirty="0"/>
           </a:p>
@@ -3578,7 +3578,7 @@
             <a:fld id="{B61BEF0D-F0BB-DE4B-95CE-6DB70DBA9567}" type="datetimeFigureOut">
               <a:rPr lang="en-US" dirty="0"/>
               <a:pPr/>
-              <a:t>9/29/2020</a:t>
+              <a:t>9/30/2020</a:t>
             </a:fld>
             <a:endParaRPr lang="en-US" dirty="0"/>
           </a:p>
@@ -3841,7 +3841,7 @@
             <a:fld id="{B61BEF0D-F0BB-DE4B-95CE-6DB70DBA9567}" type="datetimeFigureOut">
               <a:rPr lang="en-US" dirty="0"/>
               <a:pPr/>
-              <a:t>9/29/2020</a:t>
+              <a:t>9/30/2020</a:t>
             </a:fld>
             <a:endParaRPr lang="en-US" dirty="0"/>
           </a:p>
@@ -4212,7 +4212,7 @@
             <a:fld id="{B61BEF0D-F0BB-DE4B-95CE-6DB70DBA9567}" type="datetimeFigureOut">
               <a:rPr lang="en-US" dirty="0"/>
               <a:pPr/>
-              <a:t>9/29/2020</a:t>
+              <a:t>9/30/2020</a:t>
             </a:fld>
             <a:endParaRPr lang="en-US" dirty="0"/>
           </a:p>
@@ -4357,7 +4357,7 @@
             <a:fld id="{B61BEF0D-F0BB-DE4B-95CE-6DB70DBA9567}" type="datetimeFigureOut">
               <a:rPr lang="en-US" dirty="0"/>
               <a:pPr/>
-              <a:t>9/29/2020</a:t>
+              <a:t>9/30/2020</a:t>
             </a:fld>
             <a:endParaRPr lang="en-US" dirty="0"/>
           </a:p>
@@ -4479,7 +4479,7 @@
             <a:fld id="{B61BEF0D-F0BB-DE4B-95CE-6DB70DBA9567}" type="datetimeFigureOut">
               <a:rPr lang="en-US" dirty="0"/>
               <a:pPr/>
-              <a:t>9/29/2020</a:t>
+              <a:t>9/30/2020</a:t>
             </a:fld>
             <a:endParaRPr lang="en-US" dirty="0"/>
           </a:p>
@@ -4761,7 +4761,7 @@
             <a:fld id="{B61BEF0D-F0BB-DE4B-95CE-6DB70DBA9567}" type="datetimeFigureOut">
               <a:rPr lang="en-US" dirty="0"/>
               <a:pPr/>
-              <a:t>9/29/2020</a:t>
+              <a:t>9/30/2020</a:t>
             </a:fld>
             <a:endParaRPr lang="en-US" dirty="0"/>
           </a:p>
@@ -5082,7 +5082,7 @@
             <a:fld id="{B61BEF0D-F0BB-DE4B-95CE-6DB70DBA9567}" type="datetimeFigureOut">
               <a:rPr lang="en-US" dirty="0"/>
               <a:pPr/>
-              <a:t>9/29/2020</a:t>
+              <a:t>9/30/2020</a:t>
             </a:fld>
             <a:endParaRPr lang="en-US" dirty="0"/>
           </a:p>
@@ -5293,7 +5293,7 @@
             <a:fld id="{B61BEF0D-F0BB-DE4B-95CE-6DB70DBA9567}" type="datetimeFigureOut">
               <a:rPr lang="en-US" dirty="0"/>
               <a:pPr/>
-              <a:t>9/29/2020</a:t>
+              <a:t>9/30/2020</a:t>
             </a:fld>
             <a:endParaRPr lang="en-US" dirty="0"/>
           </a:p>
@@ -5932,14 +5932,19 @@
             <p:ph idx="1"/>
           </p:nvPr>
         </p:nvSpPr>
-        <p:spPr/>
+        <p:spPr>
+          <a:xfrm>
+            <a:off x="685801" y="2142067"/>
+            <a:ext cx="10131425" cy="2057071"/>
+          </a:xfrm>
+        </p:spPr>
         <p:txBody>
           <a:bodyPr/>
           <a:lstStyle/>
           <a:p>
             <a:r>
               <a:rPr lang="en-CA" dirty="0"/>
-              <a:t>Created by Linus Torvalds (creator of Linux) in 2005 after </a:t>
+              <a:t>Created by Finnish-American Software Engineer, Linus Torvalds (creator of Linux) in 2005 after </a:t>
             </a:r>
             <a:r>
               <a:rPr lang="en-CA" dirty="0" err="1"/>
@@ -5984,6 +5989,83 @@
               <a:t>BitKeeper</a:t>
             </a:r>
             <a:endParaRPr lang="en-CA" dirty="0"/>
+          </a:p>
+        </p:txBody>
+      </p:sp>
+      <p:sp>
+        <p:nvSpPr>
+          <p:cNvPr id="4" name="TextBox 3">
+            <a:extLst>
+              <a:ext uri="{FF2B5EF4-FFF2-40B4-BE49-F238E27FC236}">
+                <a16:creationId xmlns:a16="http://schemas.microsoft.com/office/drawing/2014/main" id="{B7922FDE-F58E-40C2-B915-8D7C9FF99E31}"/>
+              </a:ext>
+            </a:extLst>
+          </p:cNvPr>
+          <p:cNvSpPr txBox="1"/>
+          <p:nvPr/>
+        </p:nvSpPr>
+        <p:spPr>
+          <a:xfrm>
+            <a:off x="1206146" y="4625266"/>
+            <a:ext cx="9090734" cy="1508105"/>
+          </a:xfrm>
+          <a:prstGeom prst="rect">
+            <a:avLst/>
+          </a:prstGeom>
+          <a:noFill/>
+        </p:spPr>
+        <p:txBody>
+          <a:bodyPr wrap="square" rtlCol="0">
+            <a:spAutoFit/>
+          </a:bodyPr>
+          <a:lstStyle/>
+          <a:p>
+            <a:r>
+              <a:rPr lang="en-US" i="1" dirty="0"/>
+              <a:t>Time magazine</a:t>
+            </a:r>
+            <a:r>
+              <a:rPr lang="en-US" dirty="0"/>
+              <a:t>, alone has recognized Torvalds multiple times:</a:t>
+            </a:r>
+          </a:p>
+          <a:p>
+            <a:r>
+              <a:rPr lang="en-US" dirty="0"/>
+              <a:t>	</a:t>
+            </a:r>
+            <a:r>
+              <a:rPr lang="en-US" sz="1400" dirty="0"/>
+              <a:t>In 2000, he was 17th in their Time 100: The Most Important People of the Century poll.</a:t>
+            </a:r>
+          </a:p>
+          <a:p>
+            <a:r>
+              <a:rPr lang="en-US" sz="1400" dirty="0"/>
+              <a:t>	In 2004, he was named one of the most influential people in the world by Time magazine.</a:t>
+            </a:r>
+          </a:p>
+          <a:p>
+            <a:r>
+              <a:rPr lang="en-US" sz="1400" dirty="0"/>
+              <a:t>	In 2006, the magazine's Europe edition named him one of the revolutionary heroes of the past 60 years.</a:t>
+            </a:r>
+          </a:p>
+          <a:p>
+            <a:endParaRPr lang="en-US" sz="1400" dirty="0"/>
+          </a:p>
+          <a:p>
+            <a:r>
+              <a:rPr lang="en-US" sz="1400" dirty="0"/>
+              <a:t>Source: </a:t>
+            </a:r>
+            <a:r>
+              <a:rPr lang="en-CA" sz="1400" dirty="0">
+                <a:hlinkClick r:id="rId2"/>
+              </a:rPr>
+              <a:t>https://en.wikipedia.org/wiki/Linus_Torvalds</a:t>
+            </a:r>
+            <a:endParaRPr lang="en-CA" sz="1400" dirty="0"/>
           </a:p>
         </p:txBody>
       </p:sp>
@@ -6176,41 +6258,115 @@
           <a:chExt cx="0" cy="0"/>
         </a:xfrm>
       </p:grpSpPr>
-      <p:pic>
-        <p:nvPicPr>
-          <p:cNvPr id="5" name="Content Placeholder 4" descr="A picture containing diagram&#10;&#10;Description automatically generated">
+      <p:sp>
+        <p:nvSpPr>
+          <p:cNvPr id="2" name="Title 1">
             <a:extLst>
               <a:ext uri="{FF2B5EF4-FFF2-40B4-BE49-F238E27FC236}">
-                <a16:creationId xmlns:a16="http://schemas.microsoft.com/office/drawing/2014/main" id="{E43037D4-2E2A-4240-B112-AC99B3CE95E4}"/>
+                <a16:creationId xmlns:a16="http://schemas.microsoft.com/office/drawing/2014/main" id="{254EFBE8-A187-4850-ABBE-002B022FD45E}"/>
               </a:ext>
             </a:extLst>
           </p:cNvPr>
-          <p:cNvPicPr>
-            <a:picLocks noGrp="1" noChangeAspect="1"/>
-          </p:cNvPicPr>
-          <p:nvPr>
-            <p:ph idx="1"/>
-          </p:nvPr>
-        </p:nvPicPr>
-        <p:blipFill>
-          <a:blip r:embed="rId2"/>
-          <a:stretch>
-            <a:fillRect/>
-          </a:stretch>
-        </p:blipFill>
-        <p:spPr>
-          <a:xfrm>
-            <a:off x="1532785" y="1323380"/>
-            <a:ext cx="9126429" cy="5126487"/>
-          </a:xfrm>
-        </p:spPr>
-      </p:pic>
-      <p:sp>
-        <p:nvSpPr>
-          <p:cNvPr id="6" name="TextBox 5">
+          <p:cNvSpPr>
+            <a:spLocks noGrp="1"/>
+          </p:cNvSpPr>
+          <p:nvPr>
+            <p:ph type="title"/>
+          </p:nvPr>
+        </p:nvSpPr>
+        <p:spPr>
+          <a:xfrm>
+            <a:off x="685801" y="609600"/>
+            <a:ext cx="3087209" cy="1032769"/>
+          </a:xfrm>
+        </p:spPr>
+        <p:txBody>
+          <a:bodyPr>
+            <a:normAutofit/>
+          </a:bodyPr>
+          <a:lstStyle/>
+          <a:p>
+            <a:r>
+              <a:rPr lang="en-CA" sz="3600" dirty="0">
+                <a:latin typeface="+mj-lt"/>
+              </a:rPr>
+              <a:t>CI/CD with Git</a:t>
+            </a:r>
+            <a:endParaRPr lang="en-CA" dirty="0"/>
+          </a:p>
+        </p:txBody>
+      </p:sp>
+      <p:sp>
+        <p:nvSpPr>
+          <p:cNvPr id="3" name="Content Placeholder 2">
             <a:extLst>
               <a:ext uri="{FF2B5EF4-FFF2-40B4-BE49-F238E27FC236}">
-                <a16:creationId xmlns:a16="http://schemas.microsoft.com/office/drawing/2014/main" id="{0281B87A-C292-455A-B94F-368730F4DC85}"/>
+                <a16:creationId xmlns:a16="http://schemas.microsoft.com/office/drawing/2014/main" id="{71785841-C527-45B6-ABDC-FB23B323A228}"/>
+              </a:ext>
+            </a:extLst>
+          </p:cNvPr>
+          <p:cNvSpPr>
+            <a:spLocks noGrp="1"/>
+          </p:cNvSpPr>
+          <p:nvPr>
+            <p:ph idx="1"/>
+          </p:nvPr>
+        </p:nvSpPr>
+        <p:spPr>
+          <a:xfrm>
+            <a:off x="685801" y="1538386"/>
+            <a:ext cx="10131425" cy="3051370"/>
+          </a:xfrm>
+        </p:spPr>
+        <p:txBody>
+          <a:bodyPr/>
+          <a:lstStyle/>
+          <a:p>
+            <a:r>
+              <a:rPr lang="en-US" b="0" i="1" u="none" strike="noStrike" dirty="0">
+                <a:effectLst/>
+                <a:latin typeface="museo-sans"/>
+                <a:hlinkClick r:id="rId2">
+                  <a:extLst>
+                    <a:ext uri="{A12FA001-AC4F-418D-AE19-62706E023703}">
+                      <ahyp:hlinkClr xmlns:ahyp="http://schemas.microsoft.com/office/drawing/2018/hyperlinkcolor" val="tx"/>
+                    </a:ext>
+                  </a:extLst>
+                </a:hlinkClick>
+              </a:rPr>
+              <a:t>Continuous integration</a:t>
+            </a:r>
+            <a:r>
+              <a:rPr lang="en-US" b="0" i="0" dirty="0">
+                <a:effectLst/>
+                <a:latin typeface="museo-sans"/>
+              </a:rPr>
+              <a:t> is a coding philosophy and set of practices that drive development teams to implement small changes and check in code to version control repositories frequently. Because most modern applications require developing code in different platforms and tools, the team needs a mechanism to integrate and validate its changes.</a:t>
+            </a:r>
+          </a:p>
+          <a:p>
+            <a:r>
+              <a:rPr lang="en-US" i="1" u="sng" dirty="0"/>
+              <a:t>Continuous delivery</a:t>
+            </a:r>
+            <a:r>
+              <a:rPr lang="en-US" i="1" dirty="0"/>
+              <a:t> </a:t>
+            </a:r>
+            <a:r>
+              <a:rPr lang="en-US" dirty="0"/>
+              <a:t>picks up where continuous integration ends. CD automates the delivery of applications to selected infrastructure environments. Most teams work with multiple environments other than the production, such as development and testing environments, and CD ensures there is an automated way to push code changes to them.</a:t>
+            </a:r>
+            <a:endParaRPr lang="en-CA" dirty="0"/>
+          </a:p>
+        </p:txBody>
+      </p:sp>
+      <p:sp>
+        <p:nvSpPr>
+          <p:cNvPr id="4" name="TextBox 3">
+            <a:extLst>
+              <a:ext uri="{FF2B5EF4-FFF2-40B4-BE49-F238E27FC236}">
+                <a16:creationId xmlns:a16="http://schemas.microsoft.com/office/drawing/2014/main" id="{E360E7A4-D549-4737-BD44-E5D36D423762}"/>
               </a:ext>
             </a:extLst>
           </p:cNvPr>
@@ -6219,8 +6375,8 @@
         </p:nvSpPr>
         <p:spPr>
           <a:xfrm>
-            <a:off x="885824" y="400050"/>
-            <a:ext cx="4325368" cy="923330"/>
+            <a:off x="1074198" y="5912528"/>
+            <a:ext cx="7915565" cy="276999"/>
           </a:xfrm>
           <a:prstGeom prst="rect">
             <a:avLst/>
@@ -6228,22 +6384,52 @@
           <a:noFill/>
         </p:spPr>
         <p:txBody>
-          <a:bodyPr wrap="square" rtlCol="0">
+          <a:bodyPr wrap="none" rtlCol="0">
             <a:spAutoFit/>
           </a:bodyPr>
           <a:lstStyle/>
           <a:p>
             <a:r>
-              <a:rPr lang="en-CA" sz="3600" dirty="0">
-                <a:latin typeface="+mj-lt"/>
+              <a:rPr lang="en-CA" sz="1200" dirty="0">
+                <a:hlinkClick r:id="rId3"/>
               </a:rPr>
-              <a:t>CI/CD with Git</a:t>
-            </a:r>
-          </a:p>
-          <a:p>
-            <a:r>
-              <a:rPr lang="en-CA" dirty="0"/>
-              <a:t>Continuous Integration/Continuous Delivery</a:t>
+              <a:t> https://www.infoworld.com/article/3271126/what-is-cicd-continuous-integration-and-continuous-delivery-explained.html</a:t>
+            </a:r>
+            <a:endParaRPr lang="en-CA" sz="1200" dirty="0"/>
+          </a:p>
+        </p:txBody>
+      </p:sp>
+      <p:sp>
+        <p:nvSpPr>
+          <p:cNvPr id="5" name="TextBox 4">
+            <a:extLst>
+              <a:ext uri="{FF2B5EF4-FFF2-40B4-BE49-F238E27FC236}">
+                <a16:creationId xmlns:a16="http://schemas.microsoft.com/office/drawing/2014/main" id="{84A97834-16D5-473F-ABB2-AC40474A66F9}"/>
+              </a:ext>
+            </a:extLst>
+          </p:cNvPr>
+          <p:cNvSpPr txBox="1"/>
+          <p:nvPr/>
+        </p:nvSpPr>
+        <p:spPr>
+          <a:xfrm>
+            <a:off x="1074198" y="5635529"/>
+            <a:ext cx="652102" cy="276999"/>
+          </a:xfrm>
+          <a:prstGeom prst="rect">
+            <a:avLst/>
+          </a:prstGeom>
+          <a:noFill/>
+        </p:spPr>
+        <p:txBody>
+          <a:bodyPr wrap="none" rtlCol="0">
+            <a:spAutoFit/>
+          </a:bodyPr>
+          <a:lstStyle/>
+          <a:p>
+            <a:r>
+              <a:rPr lang="en-CA" sz="1200" dirty="0"/>
+              <a:t>Source:</a:t>
             </a:r>
           </a:p>
         </p:txBody>
@@ -6251,7 +6437,7 @@
     </p:spTree>
     <p:extLst>
       <p:ext uri="{BB962C8B-B14F-4D97-AF65-F5344CB8AC3E}">
-        <p14:creationId xmlns:p14="http://schemas.microsoft.com/office/powerpoint/2010/main" val="3688298017"/>
+        <p14:creationId xmlns:p14="http://schemas.microsoft.com/office/powerpoint/2010/main" val="68268295"/>
       </p:ext>
     </p:extLst>
   </p:cSld>
@@ -6278,115 +6464,41 @@
           <a:chExt cx="0" cy="0"/>
         </a:xfrm>
       </p:grpSpPr>
-      <p:sp>
-        <p:nvSpPr>
-          <p:cNvPr id="2" name="Title 1">
+      <p:pic>
+        <p:nvPicPr>
+          <p:cNvPr id="5" name="Content Placeholder 4" descr="A picture containing diagram&#10;&#10;Description automatically generated">
             <a:extLst>
               <a:ext uri="{FF2B5EF4-FFF2-40B4-BE49-F238E27FC236}">
-                <a16:creationId xmlns:a16="http://schemas.microsoft.com/office/drawing/2014/main" id="{254EFBE8-A187-4850-ABBE-002B022FD45E}"/>
+                <a16:creationId xmlns:a16="http://schemas.microsoft.com/office/drawing/2014/main" id="{E43037D4-2E2A-4240-B112-AC99B3CE95E4}"/>
               </a:ext>
             </a:extLst>
           </p:cNvPr>
-          <p:cNvSpPr>
-            <a:spLocks noGrp="1"/>
-          </p:cNvSpPr>
-          <p:nvPr>
-            <p:ph type="title"/>
-          </p:nvPr>
-        </p:nvSpPr>
-        <p:spPr>
-          <a:xfrm>
-            <a:off x="685801" y="609600"/>
-            <a:ext cx="3087209" cy="1032769"/>
-          </a:xfrm>
-        </p:spPr>
-        <p:txBody>
-          <a:bodyPr>
-            <a:normAutofit/>
-          </a:bodyPr>
-          <a:lstStyle/>
-          <a:p>
-            <a:r>
-              <a:rPr lang="en-CA" sz="3600" dirty="0">
-                <a:latin typeface="+mj-lt"/>
-              </a:rPr>
-              <a:t>CI/CD with Git</a:t>
-            </a:r>
-            <a:endParaRPr lang="en-CA" dirty="0"/>
-          </a:p>
-        </p:txBody>
-      </p:sp>
-      <p:sp>
-        <p:nvSpPr>
-          <p:cNvPr id="3" name="Content Placeholder 2">
+          <p:cNvPicPr>
+            <a:picLocks noGrp="1" noChangeAspect="1"/>
+          </p:cNvPicPr>
+          <p:nvPr>
+            <p:ph idx="1"/>
+          </p:nvPr>
+        </p:nvPicPr>
+        <p:blipFill>
+          <a:blip r:embed="rId2"/>
+          <a:stretch>
+            <a:fillRect/>
+          </a:stretch>
+        </p:blipFill>
+        <p:spPr>
+          <a:xfrm>
+            <a:off x="1532785" y="1323380"/>
+            <a:ext cx="9126429" cy="5126487"/>
+          </a:xfrm>
+        </p:spPr>
+      </p:pic>
+      <p:sp>
+        <p:nvSpPr>
+          <p:cNvPr id="6" name="TextBox 5">
             <a:extLst>
               <a:ext uri="{FF2B5EF4-FFF2-40B4-BE49-F238E27FC236}">
-                <a16:creationId xmlns:a16="http://schemas.microsoft.com/office/drawing/2014/main" id="{71785841-C527-45B6-ABDC-FB23B323A228}"/>
-              </a:ext>
-            </a:extLst>
-          </p:cNvPr>
-          <p:cNvSpPr>
-            <a:spLocks noGrp="1"/>
-          </p:cNvSpPr>
-          <p:nvPr>
-            <p:ph idx="1"/>
-          </p:nvPr>
-        </p:nvSpPr>
-        <p:spPr>
-          <a:xfrm>
-            <a:off x="685801" y="1538386"/>
-            <a:ext cx="10131425" cy="3051370"/>
-          </a:xfrm>
-        </p:spPr>
-        <p:txBody>
-          <a:bodyPr/>
-          <a:lstStyle/>
-          <a:p>
-            <a:r>
-              <a:rPr lang="en-US" b="0" i="1" u="none" strike="noStrike" dirty="0">
-                <a:effectLst/>
-                <a:latin typeface="museo-sans"/>
-                <a:hlinkClick r:id="rId2">
-                  <a:extLst>
-                    <a:ext uri="{A12FA001-AC4F-418D-AE19-62706E023703}">
-                      <ahyp:hlinkClr xmlns:ahyp="http://schemas.microsoft.com/office/drawing/2018/hyperlinkcolor" val="tx"/>
-                    </a:ext>
-                  </a:extLst>
-                </a:hlinkClick>
-              </a:rPr>
-              <a:t>Continuous integration</a:t>
-            </a:r>
-            <a:r>
-              <a:rPr lang="en-US" b="0" i="0" dirty="0">
-                <a:effectLst/>
-                <a:latin typeface="museo-sans"/>
-              </a:rPr>
-              <a:t> is a coding philosophy and set of practices that drive development teams to implement small changes and check in code to version control repositories frequently. Because most modern applications require developing code in different platforms and tools, the team needs a mechanism to integrate and validate its changes.</a:t>
-            </a:r>
-          </a:p>
-          <a:p>
-            <a:r>
-              <a:rPr lang="en-US" i="1" u="sng" dirty="0"/>
-              <a:t>Continuous delivery</a:t>
-            </a:r>
-            <a:r>
-              <a:rPr lang="en-US" i="1" dirty="0"/>
-              <a:t> </a:t>
-            </a:r>
-            <a:r>
-              <a:rPr lang="en-US" dirty="0"/>
-              <a:t>picks up where continuous integration ends. CD automates the delivery of applications to selected infrastructure environments. Most teams work with multiple environments other than the production, such as development and testing environments, and CD ensures there is an automated way to push code changes to them.</a:t>
-            </a:r>
-            <a:endParaRPr lang="en-CA" dirty="0"/>
-          </a:p>
-        </p:txBody>
-      </p:sp>
-      <p:sp>
-        <p:nvSpPr>
-          <p:cNvPr id="4" name="TextBox 3">
-            <a:extLst>
-              <a:ext uri="{FF2B5EF4-FFF2-40B4-BE49-F238E27FC236}">
-                <a16:creationId xmlns:a16="http://schemas.microsoft.com/office/drawing/2014/main" id="{E360E7A4-D549-4737-BD44-E5D36D423762}"/>
+                <a16:creationId xmlns:a16="http://schemas.microsoft.com/office/drawing/2014/main" id="{0281B87A-C292-455A-B94F-368730F4DC85}"/>
               </a:ext>
             </a:extLst>
           </p:cNvPr>
@@ -6395,8 +6507,8 @@
         </p:nvSpPr>
         <p:spPr>
           <a:xfrm>
-            <a:off x="1074198" y="5912528"/>
-            <a:ext cx="7915565" cy="276999"/>
+            <a:off x="885824" y="400050"/>
+            <a:ext cx="4325368" cy="923330"/>
           </a:xfrm>
           <a:prstGeom prst="rect">
             <a:avLst/>
@@ -6404,52 +6516,22 @@
           <a:noFill/>
         </p:spPr>
         <p:txBody>
-          <a:bodyPr wrap="none" rtlCol="0">
+          <a:bodyPr wrap="square" rtlCol="0">
             <a:spAutoFit/>
           </a:bodyPr>
           <a:lstStyle/>
           <a:p>
             <a:r>
-              <a:rPr lang="en-CA" sz="1200" dirty="0">
-                <a:hlinkClick r:id="rId3"/>
+              <a:rPr lang="en-CA" sz="3600" dirty="0">
+                <a:latin typeface="+mj-lt"/>
               </a:rPr>
-              <a:t> https://www.infoworld.com/article/3271126/what-is-cicd-continuous-integration-and-continuous-delivery-explained.html</a:t>
-            </a:r>
-            <a:endParaRPr lang="en-CA" sz="1200" dirty="0"/>
-          </a:p>
-        </p:txBody>
-      </p:sp>
-      <p:sp>
-        <p:nvSpPr>
-          <p:cNvPr id="5" name="TextBox 4">
-            <a:extLst>
-              <a:ext uri="{FF2B5EF4-FFF2-40B4-BE49-F238E27FC236}">
-                <a16:creationId xmlns:a16="http://schemas.microsoft.com/office/drawing/2014/main" id="{84A97834-16D5-473F-ABB2-AC40474A66F9}"/>
-              </a:ext>
-            </a:extLst>
-          </p:cNvPr>
-          <p:cNvSpPr txBox="1"/>
-          <p:nvPr/>
-        </p:nvSpPr>
-        <p:spPr>
-          <a:xfrm>
-            <a:off x="1074198" y="5635529"/>
-            <a:ext cx="652102" cy="276999"/>
-          </a:xfrm>
-          <a:prstGeom prst="rect">
-            <a:avLst/>
-          </a:prstGeom>
-          <a:noFill/>
-        </p:spPr>
-        <p:txBody>
-          <a:bodyPr wrap="none" rtlCol="0">
-            <a:spAutoFit/>
-          </a:bodyPr>
-          <a:lstStyle/>
-          <a:p>
-            <a:r>
-              <a:rPr lang="en-CA" sz="1200" dirty="0"/>
-              <a:t>Source:</a:t>
+              <a:t>CI/CD with Git</a:t>
+            </a:r>
+          </a:p>
+          <a:p>
+            <a:r>
+              <a:rPr lang="en-CA" dirty="0"/>
+              <a:t>Continuous Integration/Continuous Delivery</a:t>
             </a:r>
           </a:p>
         </p:txBody>
@@ -6457,7 +6539,7 @@
     </p:spTree>
     <p:extLst>
       <p:ext uri="{BB962C8B-B14F-4D97-AF65-F5344CB8AC3E}">
-        <p14:creationId xmlns:p14="http://schemas.microsoft.com/office/powerpoint/2010/main" val="68268295"/>
+        <p14:creationId xmlns:p14="http://schemas.microsoft.com/office/powerpoint/2010/main" val="3688298017"/>
       </p:ext>
     </p:extLst>
   </p:cSld>

</xml_diff>

<commit_message>
some progress on pp
</commit_message>
<xml_diff>
--- a/GIT 101.pptx
+++ b/GIT 101.pptx
@@ -11,8 +11,10 @@
     <p:sldId id="260" r:id="rId5"/>
     <p:sldId id="258" r:id="rId6"/>
     <p:sldId id="261" r:id="rId7"/>
-    <p:sldId id="262" r:id="rId8"/>
-    <p:sldId id="263" r:id="rId9"/>
+    <p:sldId id="264" r:id="rId8"/>
+    <p:sldId id="262" r:id="rId9"/>
+    <p:sldId id="265" r:id="rId10"/>
+    <p:sldId id="263" r:id="rId11"/>
   </p:sldIdLst>
   <p:sldSz cx="12192000" cy="6858000"/>
   <p:notesSz cx="6858000" cy="9144000"/>
@@ -5871,6 +5873,95 @@
 </p:sld>
 </file>
 
+<file path=ppt/slides/slide10.xml><?xml version="1.0" encoding="utf-8"?>
+<p:sld xmlns:a="http://schemas.openxmlformats.org/drawingml/2006/main" xmlns:r="http://schemas.openxmlformats.org/officeDocument/2006/relationships" xmlns:p="http://schemas.openxmlformats.org/presentationml/2006/main">
+  <p:cSld>
+    <p:spTree>
+      <p:nvGrpSpPr>
+        <p:cNvPr id="1" name=""/>
+        <p:cNvGrpSpPr/>
+        <p:nvPr/>
+      </p:nvGrpSpPr>
+      <p:grpSpPr>
+        <a:xfrm>
+          <a:off x="0" y="0"/>
+          <a:ext cx="0" cy="0"/>
+          <a:chOff x="0" y="0"/>
+          <a:chExt cx="0" cy="0"/>
+        </a:xfrm>
+      </p:grpSpPr>
+      <p:sp>
+        <p:nvSpPr>
+          <p:cNvPr id="2" name="Title 1">
+            <a:extLst>
+              <a:ext uri="{FF2B5EF4-FFF2-40B4-BE49-F238E27FC236}">
+                <a16:creationId xmlns:a16="http://schemas.microsoft.com/office/drawing/2014/main" id="{0B3ECEF2-7447-4A85-A39F-7F83EF1679AD}"/>
+              </a:ext>
+            </a:extLst>
+          </p:cNvPr>
+          <p:cNvSpPr>
+            <a:spLocks noGrp="1"/>
+          </p:cNvSpPr>
+          <p:nvPr>
+            <p:ph type="title"/>
+          </p:nvPr>
+        </p:nvSpPr>
+        <p:spPr/>
+        <p:txBody>
+          <a:bodyPr/>
+          <a:lstStyle/>
+          <a:p>
+            <a:r>
+              <a:rPr lang="en-CA" dirty="0"/>
+              <a:t>Valuable links</a:t>
+            </a:r>
+          </a:p>
+        </p:txBody>
+      </p:sp>
+      <p:sp>
+        <p:nvSpPr>
+          <p:cNvPr id="3" name="Content Placeholder 2">
+            <a:extLst>
+              <a:ext uri="{FF2B5EF4-FFF2-40B4-BE49-F238E27FC236}">
+                <a16:creationId xmlns:a16="http://schemas.microsoft.com/office/drawing/2014/main" id="{B73C8D24-2E62-4EDF-B561-47B7B09AED15}"/>
+              </a:ext>
+            </a:extLst>
+          </p:cNvPr>
+          <p:cNvSpPr>
+            <a:spLocks noGrp="1"/>
+          </p:cNvSpPr>
+          <p:nvPr>
+            <p:ph idx="1"/>
+          </p:nvPr>
+        </p:nvSpPr>
+        <p:spPr/>
+        <p:txBody>
+          <a:bodyPr/>
+          <a:lstStyle/>
+          <a:p>
+            <a:r>
+              <a:rPr lang="en-CA" dirty="0">
+                <a:hlinkClick r:id="rId2"/>
+              </a:rPr>
+              <a:t>https://git-scm.com/</a:t>
+            </a:r>
+            <a:endParaRPr lang="en-CA" dirty="0"/>
+          </a:p>
+        </p:txBody>
+      </p:sp>
+    </p:spTree>
+    <p:extLst>
+      <p:ext uri="{BB962C8B-B14F-4D97-AF65-F5344CB8AC3E}">
+        <p14:creationId xmlns:p14="http://schemas.microsoft.com/office/powerpoint/2010/main" val="4234063146"/>
+      </p:ext>
+    </p:extLst>
+  </p:cSld>
+  <p:clrMapOvr>
+    <a:masterClrMapping/>
+  </p:clrMapOvr>
+</p:sld>
+</file>
+
 <file path=ppt/slides/slide2.xml><?xml version="1.0" encoding="utf-8"?>
 <p:sld xmlns:a="http://schemas.openxmlformats.org/drawingml/2006/main" xmlns:r="http://schemas.openxmlformats.org/officeDocument/2006/relationships" xmlns:p="http://schemas.openxmlformats.org/presentationml/2006/main">
   <p:cSld>
@@ -6582,14 +6673,19 @@
             <p:ph type="title"/>
           </p:nvPr>
         </p:nvSpPr>
-        <p:spPr/>
+        <p:spPr>
+          <a:xfrm>
+            <a:off x="685801" y="609601"/>
+            <a:ext cx="10131425" cy="739806"/>
+          </a:xfrm>
+        </p:spPr>
         <p:txBody>
           <a:bodyPr/>
           <a:lstStyle/>
           <a:p>
             <a:r>
               <a:rPr lang="en-CA" dirty="0"/>
-              <a:t>The basics of git</a:t>
+              <a:t>The basic commands</a:t>
             </a:r>
           </a:p>
         </p:txBody>
@@ -6612,8 +6708,8 @@
         </p:nvSpPr>
         <p:spPr>
           <a:xfrm>
-            <a:off x="685801" y="2142067"/>
-            <a:ext cx="2368117" cy="3649133"/>
+            <a:off x="685801" y="1349407"/>
+            <a:ext cx="9825360" cy="3649133"/>
           </a:xfrm>
         </p:spPr>
         <p:txBody>
@@ -6621,50 +6717,253 @@
           <a:lstStyle/>
           <a:p>
             <a:r>
+              <a:rPr lang="en-CA" b="1" dirty="0"/>
+              <a:t>clone</a:t>
+            </a:r>
+            <a:r>
               <a:rPr lang="en-CA" dirty="0"/>
-              <a:t>clone</a:t>
-            </a:r>
-          </a:p>
-          <a:p>
+              <a:t> – create a copy of an entire repo – usually done once (per machine), in the beginning  </a:t>
+            </a:r>
+          </a:p>
+          <a:p>
+            <a:r>
+              <a:rPr lang="en-CA" b="1" dirty="0"/>
+              <a:t>fetch</a:t>
+            </a:r>
             <a:r>
               <a:rPr lang="en-CA" dirty="0"/>
-              <a:t>fetch</a:t>
-            </a:r>
-          </a:p>
-          <a:p>
+              <a:t> – updates metadata including commit history and branches (does not change code)</a:t>
+            </a:r>
+          </a:p>
+          <a:p>
+            <a:r>
+              <a:rPr lang="en-CA" b="1" dirty="0"/>
+              <a:t>add</a:t>
+            </a:r>
             <a:r>
               <a:rPr lang="en-CA" dirty="0"/>
-              <a:t>add (stage)</a:t>
-            </a:r>
-          </a:p>
-          <a:p>
+              <a:t> (stage) – place a file in the staging area…ready to commit.</a:t>
+            </a:r>
+          </a:p>
+          <a:p>
+            <a:r>
+              <a:rPr lang="en-CA" b="1" dirty="0"/>
+              <a:t>commit</a:t>
+            </a:r>
             <a:r>
               <a:rPr lang="en-CA" dirty="0"/>
-              <a:t>commit</a:t>
-            </a:r>
-          </a:p>
-          <a:p>
+              <a:t> – takes a ‘snapshot’ of the changes you have staged. Only affects local repo (until push)</a:t>
+            </a:r>
+          </a:p>
+          <a:p>
+            <a:r>
+              <a:rPr lang="en-CA" b="1" dirty="0"/>
+              <a:t>pull</a:t>
+            </a:r>
             <a:r>
               <a:rPr lang="en-CA" dirty="0"/>
+              <a:t> – gets changes from the server and updates your local repo</a:t>
+            </a:r>
+          </a:p>
+          <a:p>
+            <a:r>
+              <a:rPr lang="en-CA" b="1" dirty="0"/>
               <a:t>push</a:t>
             </a:r>
-          </a:p>
-          <a:p>
             <a:r>
               <a:rPr lang="en-CA" dirty="0"/>
-              <a:t>pull</a:t>
-            </a:r>
-          </a:p>
-          <a:p>
+              <a:t> – ‘push’ your commits to the server</a:t>
+            </a:r>
+          </a:p>
+          <a:p>
+            <a:r>
+              <a:rPr lang="en-CA" b="1" dirty="0"/>
+              <a:t>branch</a:t>
+            </a:r>
             <a:r>
               <a:rPr lang="en-CA" dirty="0"/>
-              <a:t>branch</a:t>
-            </a:r>
-          </a:p>
-          <a:p>
+              <a:t> – creates a line of development independent of the others (until merged)</a:t>
+            </a:r>
+          </a:p>
+          <a:p>
+            <a:r>
+              <a:rPr lang="en-CA" b="1" dirty="0"/>
+              <a:t>checkout</a:t>
+            </a:r>
             <a:r>
               <a:rPr lang="en-CA" dirty="0"/>
+              <a:t> – choose a branch</a:t>
+            </a:r>
+          </a:p>
+          <a:p>
+            <a:r>
+              <a:rPr lang="en-CA" b="1" dirty="0"/>
               <a:t>merge</a:t>
+            </a:r>
+            <a:r>
+              <a:rPr lang="en-CA" dirty="0"/>
+              <a:t> – merge the code of different branches. (usually your feature and master)</a:t>
+            </a:r>
+          </a:p>
+        </p:txBody>
+      </p:sp>
+      <p:sp>
+        <p:nvSpPr>
+          <p:cNvPr id="4" name="Title 1">
+            <a:extLst>
+              <a:ext uri="{FF2B5EF4-FFF2-40B4-BE49-F238E27FC236}">
+                <a16:creationId xmlns:a16="http://schemas.microsoft.com/office/drawing/2014/main" id="{BE23C69C-98DA-46D1-AAC1-80A2E899E39A}"/>
+              </a:ext>
+            </a:extLst>
+          </p:cNvPr>
+          <p:cNvSpPr txBox="1">
+            <a:spLocks/>
+          </p:cNvSpPr>
+          <p:nvPr/>
+        </p:nvSpPr>
+        <p:spPr>
+          <a:xfrm>
+            <a:off x="685800" y="5356195"/>
+            <a:ext cx="10131425" cy="646331"/>
+          </a:xfrm>
+          <a:prstGeom prst="rect">
+            <a:avLst/>
+          </a:prstGeom>
+          <a:effectLst/>
+        </p:spPr>
+        <p:txBody>
+          <a:bodyPr vert="horz" lIns="91440" tIns="45720" rIns="91440" bIns="45720" rtlCol="0" anchor="ctr">
+            <a:normAutofit/>
+          </a:bodyPr>
+          <a:lstStyle>
+            <a:lvl1pPr algn="l" defTabSz="457200" rtl="0" eaLnBrk="1" latinLnBrk="0" hangingPunct="1">
+              <a:spcBef>
+                <a:spcPct val="0"/>
+              </a:spcBef>
+              <a:buNone/>
+              <a:defRPr sz="3600" kern="1200" cap="all">
+                <a:ln w="3175" cmpd="sng">
+                  <a:noFill/>
+                </a:ln>
+                <a:solidFill>
+                  <a:schemeClr val="tx1"/>
+                </a:solidFill>
+                <a:effectLst/>
+                <a:latin typeface="+mj-lt"/>
+                <a:ea typeface="+mj-ea"/>
+                <a:cs typeface="+mj-cs"/>
+              </a:defRPr>
+            </a:lvl1pPr>
+            <a:lvl2pPr eaLnBrk="1" hangingPunct="1">
+              <a:defRPr>
+                <a:solidFill>
+                  <a:schemeClr val="tx2"/>
+                </a:solidFill>
+              </a:defRPr>
+            </a:lvl2pPr>
+            <a:lvl3pPr eaLnBrk="1" hangingPunct="1">
+              <a:defRPr>
+                <a:solidFill>
+                  <a:schemeClr val="tx2"/>
+                </a:solidFill>
+              </a:defRPr>
+            </a:lvl3pPr>
+            <a:lvl4pPr eaLnBrk="1" hangingPunct="1">
+              <a:defRPr>
+                <a:solidFill>
+                  <a:schemeClr val="tx2"/>
+                </a:solidFill>
+              </a:defRPr>
+            </a:lvl4pPr>
+            <a:lvl5pPr eaLnBrk="1" hangingPunct="1">
+              <a:defRPr>
+                <a:solidFill>
+                  <a:schemeClr val="tx2"/>
+                </a:solidFill>
+              </a:defRPr>
+            </a:lvl5pPr>
+            <a:lvl6pPr eaLnBrk="1" hangingPunct="1">
+              <a:defRPr>
+                <a:solidFill>
+                  <a:schemeClr val="tx2"/>
+                </a:solidFill>
+              </a:defRPr>
+            </a:lvl6pPr>
+            <a:lvl7pPr eaLnBrk="1" hangingPunct="1">
+              <a:defRPr>
+                <a:solidFill>
+                  <a:schemeClr val="tx2"/>
+                </a:solidFill>
+              </a:defRPr>
+            </a:lvl7pPr>
+            <a:lvl8pPr eaLnBrk="1" hangingPunct="1">
+              <a:defRPr>
+                <a:solidFill>
+                  <a:schemeClr val="tx2"/>
+                </a:solidFill>
+              </a:defRPr>
+            </a:lvl8pPr>
+            <a:lvl9pPr eaLnBrk="1" hangingPunct="1">
+              <a:defRPr>
+                <a:solidFill>
+                  <a:schemeClr val="tx2"/>
+                </a:solidFill>
+              </a:defRPr>
+            </a:lvl9pPr>
+          </a:lstStyle>
+          <a:p>
+            <a:r>
+              <a:rPr lang="en-CA" dirty="0"/>
+              <a:t>Non-git terms	</a:t>
+            </a:r>
+          </a:p>
+        </p:txBody>
+      </p:sp>
+      <p:sp>
+        <p:nvSpPr>
+          <p:cNvPr id="5" name="TextBox 4">
+            <a:extLst>
+              <a:ext uri="{FF2B5EF4-FFF2-40B4-BE49-F238E27FC236}">
+                <a16:creationId xmlns:a16="http://schemas.microsoft.com/office/drawing/2014/main" id="{63543D85-A9B0-4C29-B851-A7A6DACD915F}"/>
+              </a:ext>
+            </a:extLst>
+          </p:cNvPr>
+          <p:cNvSpPr txBox="1"/>
+          <p:nvPr/>
+        </p:nvSpPr>
+        <p:spPr>
+          <a:xfrm>
+            <a:off x="685801" y="6014362"/>
+            <a:ext cx="7410490" cy="646331"/>
+          </a:xfrm>
+          <a:prstGeom prst="rect">
+            <a:avLst/>
+          </a:prstGeom>
+          <a:noFill/>
+        </p:spPr>
+        <p:txBody>
+          <a:bodyPr wrap="none" rtlCol="0">
+            <a:spAutoFit/>
+          </a:bodyPr>
+          <a:lstStyle/>
+          <a:p>
+            <a:pPr marL="285750" indent="-285750">
+              <a:buFont typeface="Arial" panose="020B0604020202020204" pitchFamily="34" charset="0"/>
+              <a:buChar char="•"/>
+            </a:pPr>
+            <a:r>
+              <a:rPr lang="en-CA" dirty="0"/>
+              <a:t>check-in – doesn’t exist in Git. Do you mean ‘commit’? or ‘push’? or both?</a:t>
+            </a:r>
+          </a:p>
+          <a:p>
+            <a:pPr marL="285750" indent="-285750">
+              <a:buFont typeface="Arial" panose="020B0604020202020204" pitchFamily="34" charset="0"/>
+              <a:buChar char="•"/>
+            </a:pPr>
+            <a:r>
+              <a:rPr lang="en-CA" dirty="0"/>
+              <a:t>sync – Visual Studio’s term for a ‘pull’ and ‘push’ combined</a:t>
             </a:r>
           </a:p>
         </p:txBody>
@@ -6701,38 +7000,82 @@
       </p:grpSpPr>
       <p:sp>
         <p:nvSpPr>
-          <p:cNvPr id="2" name="Title 1">
+          <p:cNvPr id="4" name="TextBox 3">
             <a:extLst>
               <a:ext uri="{FF2B5EF4-FFF2-40B4-BE49-F238E27FC236}">
-                <a16:creationId xmlns:a16="http://schemas.microsoft.com/office/drawing/2014/main" id="{6D624A7E-1A39-4347-B87B-2C37B7F03A60}"/>
+                <a16:creationId xmlns:a16="http://schemas.microsoft.com/office/drawing/2014/main" id="{0FB83CCF-3CBB-4FEB-B4DB-3C4C147BC986}"/>
               </a:ext>
             </a:extLst>
           </p:cNvPr>
-          <p:cNvSpPr>
-            <a:spLocks noGrp="1"/>
-          </p:cNvSpPr>
-          <p:nvPr>
-            <p:ph type="title"/>
-          </p:nvPr>
-        </p:nvSpPr>
-        <p:spPr/>
-        <p:txBody>
-          <a:bodyPr/>
-          <a:lstStyle/>
-          <a:p>
+          <p:cNvSpPr txBox="1"/>
+          <p:nvPr/>
+        </p:nvSpPr>
+        <p:spPr>
+          <a:xfrm>
+            <a:off x="685801" y="1731145"/>
+            <a:ext cx="10910657" cy="2585323"/>
+          </a:xfrm>
+          <a:prstGeom prst="rect">
+            <a:avLst/>
+          </a:prstGeom>
+          <a:noFill/>
+        </p:spPr>
+        <p:txBody>
+          <a:bodyPr wrap="square" rtlCol="0">
+            <a:spAutoFit/>
+          </a:bodyPr>
+          <a:lstStyle/>
+          <a:p>
+            <a:pPr marL="285750" indent="-285750">
+              <a:buFont typeface="Arial" panose="020B0604020202020204" pitchFamily="34" charset="0"/>
+              <a:buChar char="•"/>
+            </a:pPr>
             <a:r>
               <a:rPr lang="en-CA" dirty="0"/>
-              <a:t>Let’s go!</a:t>
-            </a:r>
-          </a:p>
-        </p:txBody>
-      </p:sp>
-      <p:sp>
-        <p:nvSpPr>
-          <p:cNvPr id="3" name="Content Placeholder 2">
+              <a:t>Make sure you’re on the intended branch. One of the best things about Git is the ability to switch back and forth between branches, checkout other developers branches and collaborate with their work, but if you make code changes on the wrong branch, it can be a pain.</a:t>
+            </a:r>
+          </a:p>
+          <a:p>
+            <a:pPr marL="285750" indent="-285750">
+              <a:buFont typeface="Arial" panose="020B0604020202020204" pitchFamily="34" charset="0"/>
+              <a:buChar char="•"/>
+            </a:pPr>
+            <a:r>
+              <a:rPr lang="en-CA" dirty="0"/>
+              <a:t>You can only ever work on one branch at a time. Each branch is a potentially different version of all the content in the repo.</a:t>
+            </a:r>
+          </a:p>
+          <a:p>
+            <a:pPr marL="285750" indent="-285750">
+              <a:buFont typeface="Arial" panose="020B0604020202020204" pitchFamily="34" charset="0"/>
+              <a:buChar char="•"/>
+            </a:pPr>
+            <a:r>
+              <a:rPr lang="en-CA" dirty="0"/>
+              <a:t>It’s almost always a good idea to ‘pull’ before ‘push’ (if anyone else could be making changes on the branch you’re working on) to avoid conflicts.</a:t>
+            </a:r>
+          </a:p>
+          <a:p>
+            <a:pPr marL="285750" indent="-285750">
+              <a:buFont typeface="Arial" panose="020B0604020202020204" pitchFamily="34" charset="0"/>
+              <a:buChar char="•"/>
+            </a:pPr>
+            <a:r>
+              <a:rPr lang="en-CA" dirty="0"/>
+              <a:t>It’s also a good idea to ‘sync’ master often. You should make sure master is up-to-date and …</a:t>
+            </a:r>
+          </a:p>
+          <a:p>
+            <a:endParaRPr lang="en-CA" dirty="0"/>
+          </a:p>
+        </p:txBody>
+      </p:sp>
+      <p:sp>
+        <p:nvSpPr>
+          <p:cNvPr id="6" name="Title 5">
             <a:extLst>
               <a:ext uri="{FF2B5EF4-FFF2-40B4-BE49-F238E27FC236}">
-                <a16:creationId xmlns:a16="http://schemas.microsoft.com/office/drawing/2014/main" id="{C6B6F257-0E9F-4A4C-8EEC-166BB60289F6}"/>
+                <a16:creationId xmlns:a16="http://schemas.microsoft.com/office/drawing/2014/main" id="{689A23AC-56BA-4DF7-9B9B-F11AA6FCFBA5}"/>
               </a:ext>
             </a:extLst>
           </p:cNvPr>
@@ -6740,46 +7083,30 @@
             <a:spLocks noGrp="1"/>
           </p:cNvSpPr>
           <p:nvPr>
-            <p:ph idx="1"/>
-          </p:nvPr>
-        </p:nvSpPr>
-        <p:spPr/>
+            <p:ph type="title"/>
+          </p:nvPr>
+        </p:nvSpPr>
+        <p:spPr>
+          <a:xfrm>
+            <a:off x="685801" y="609600"/>
+            <a:ext cx="10131425" cy="1343487"/>
+          </a:xfrm>
+        </p:spPr>
         <p:txBody>
           <a:bodyPr/>
           <a:lstStyle/>
           <a:p>
             <a:r>
+              <a:rPr lang="en-CA" u="sng" dirty="0"/>
+              <a:t>Remember</a:t>
+            </a:r>
+            <a:r>
               <a:rPr lang="en-CA" dirty="0"/>
-              <a:t>Everybody go to </a:t>
-            </a:r>
-            <a:r>
-              <a:rPr lang="en-CA" dirty="0">
-                <a:hlinkClick r:id="rId2"/>
-              </a:rPr>
-              <a:t>https://github.com/</a:t>
-            </a:r>
-            <a:r>
+              <a:t>:</a:t>
+            </a:r>
+            <a:br>
               <a:rPr lang="en-CA" dirty="0"/>
-              <a:t> and sign up</a:t>
-            </a:r>
-          </a:p>
-          <a:p>
-            <a:r>
-              <a:rPr lang="en-CA" dirty="0"/>
-              <a:t>Go to my repo for this training session  </a:t>
-            </a:r>
-            <a:r>
-              <a:rPr lang="en-CA" dirty="0">
-                <a:hlinkClick r:id="rId3"/>
-              </a:rPr>
-              <a:t>https://github.com/BenJokela/GitTraining </a:t>
-            </a:r>
-            <a:r>
-              <a:rPr lang="en-CA" dirty="0"/>
-              <a:t>and clone to your machine</a:t>
-            </a:r>
-          </a:p>
-          <a:p>
+            </a:br>
             <a:endParaRPr lang="en-CA" dirty="0"/>
           </a:p>
         </p:txBody>
@@ -6787,7 +7114,7 @@
     </p:spTree>
     <p:extLst>
       <p:ext uri="{BB962C8B-B14F-4D97-AF65-F5344CB8AC3E}">
-        <p14:creationId xmlns:p14="http://schemas.microsoft.com/office/powerpoint/2010/main" val="495571688"/>
+        <p14:creationId xmlns:p14="http://schemas.microsoft.com/office/powerpoint/2010/main" val="2467744949"/>
       </p:ext>
     </p:extLst>
   </p:cSld>
@@ -6819,7 +7146,7 @@
           <p:cNvPr id="2" name="Title 1">
             <a:extLst>
               <a:ext uri="{FF2B5EF4-FFF2-40B4-BE49-F238E27FC236}">
-                <a16:creationId xmlns:a16="http://schemas.microsoft.com/office/drawing/2014/main" id="{0B3ECEF2-7447-4A85-A39F-7F83EF1679AD}"/>
+                <a16:creationId xmlns:a16="http://schemas.microsoft.com/office/drawing/2014/main" id="{6D624A7E-1A39-4347-B87B-2C37B7F03A60}"/>
               </a:ext>
             </a:extLst>
           </p:cNvPr>
@@ -6837,7 +7164,7 @@
           <a:p>
             <a:r>
               <a:rPr lang="en-CA" dirty="0"/>
-              <a:t>Valuable links</a:t>
+              <a:t>Let’s go!</a:t>
             </a:r>
           </a:p>
         </p:txBody>
@@ -6847,7 +7174,7 @@
           <p:cNvPr id="3" name="Content Placeholder 2">
             <a:extLst>
               <a:ext uri="{FF2B5EF4-FFF2-40B4-BE49-F238E27FC236}">
-                <a16:creationId xmlns:a16="http://schemas.microsoft.com/office/drawing/2014/main" id="{B73C8D24-2E62-4EDF-B561-47B7B09AED15}"/>
+                <a16:creationId xmlns:a16="http://schemas.microsoft.com/office/drawing/2014/main" id="{C6B6F257-0E9F-4A4C-8EEC-166BB60289F6}"/>
               </a:ext>
             </a:extLst>
           </p:cNvPr>
@@ -6864,11 +7191,37 @@
           <a:lstStyle/>
           <a:p>
             <a:r>
+              <a:rPr lang="en-CA" dirty="0"/>
+              <a:t>Everybody go to </a:t>
+            </a:r>
+            <a:r>
               <a:rPr lang="en-CA" dirty="0">
                 <a:hlinkClick r:id="rId2"/>
               </a:rPr>
-              <a:t>https://git-scm.com/</a:t>
-            </a:r>
+              <a:t>https://github.com/</a:t>
+            </a:r>
+            <a:r>
+              <a:rPr lang="en-CA" dirty="0"/>
+              <a:t> and sign up</a:t>
+            </a:r>
+          </a:p>
+          <a:p>
+            <a:r>
+              <a:rPr lang="en-CA" dirty="0"/>
+              <a:t>Go to my repo for this training session  </a:t>
+            </a:r>
+            <a:r>
+              <a:rPr lang="en-CA" dirty="0">
+                <a:hlinkClick r:id="rId3"/>
+              </a:rPr>
+              <a:t>https://github.com/BenJokela/GitTraining </a:t>
+            </a:r>
+            <a:r>
+              <a:rPr lang="en-CA" dirty="0"/>
+              <a:t>and clone to your machine</a:t>
+            </a:r>
+          </a:p>
+          <a:p>
             <a:endParaRPr lang="en-CA" dirty="0"/>
           </a:p>
         </p:txBody>
@@ -6876,7 +7229,235 @@
     </p:spTree>
     <p:extLst>
       <p:ext uri="{BB962C8B-B14F-4D97-AF65-F5344CB8AC3E}">
-        <p14:creationId xmlns:p14="http://schemas.microsoft.com/office/powerpoint/2010/main" val="4234063146"/>
+        <p14:creationId xmlns:p14="http://schemas.microsoft.com/office/powerpoint/2010/main" val="495571688"/>
+      </p:ext>
+    </p:extLst>
+  </p:cSld>
+  <p:clrMapOvr>
+    <a:masterClrMapping/>
+  </p:clrMapOvr>
+</p:sld>
+</file>
+
+<file path=ppt/slides/slide9.xml><?xml version="1.0" encoding="utf-8"?>
+<p:sld xmlns:a="http://schemas.openxmlformats.org/drawingml/2006/main" xmlns:r="http://schemas.openxmlformats.org/officeDocument/2006/relationships" xmlns:p="http://schemas.openxmlformats.org/presentationml/2006/main">
+  <p:cSld>
+    <p:spTree>
+      <p:nvGrpSpPr>
+        <p:cNvPr id="1" name=""/>
+        <p:cNvGrpSpPr/>
+        <p:nvPr/>
+      </p:nvGrpSpPr>
+      <p:grpSpPr>
+        <a:xfrm>
+          <a:off x="0" y="0"/>
+          <a:ext cx="0" cy="0"/>
+          <a:chOff x="0" y="0"/>
+          <a:chExt cx="0" cy="0"/>
+        </a:xfrm>
+      </p:grpSpPr>
+      <p:sp>
+        <p:nvSpPr>
+          <p:cNvPr id="2" name="Title 1">
+            <a:extLst>
+              <a:ext uri="{FF2B5EF4-FFF2-40B4-BE49-F238E27FC236}">
+                <a16:creationId xmlns:a16="http://schemas.microsoft.com/office/drawing/2014/main" id="{A588A44C-27C3-42BC-9893-FB78DFBD1988}"/>
+              </a:ext>
+            </a:extLst>
+          </p:cNvPr>
+          <p:cNvSpPr>
+            <a:spLocks noGrp="1"/>
+          </p:cNvSpPr>
+          <p:nvPr>
+            <p:ph type="title"/>
+          </p:nvPr>
+        </p:nvSpPr>
+        <p:spPr>
+          <a:xfrm>
+            <a:off x="685801" y="609601"/>
+            <a:ext cx="10131425" cy="668784"/>
+          </a:xfrm>
+        </p:spPr>
+        <p:txBody>
+          <a:bodyPr/>
+          <a:lstStyle/>
+          <a:p>
+            <a:r>
+              <a:rPr lang="en-CA" dirty="0" err="1"/>
+              <a:t>Devops</a:t>
+            </a:r>
+            <a:r>
+              <a:rPr lang="en-CA" dirty="0"/>
+              <a:t> specifics:</a:t>
+            </a:r>
+          </a:p>
+        </p:txBody>
+      </p:sp>
+      <p:sp>
+        <p:nvSpPr>
+          <p:cNvPr id="3" name="Content Placeholder 2">
+            <a:extLst>
+              <a:ext uri="{FF2B5EF4-FFF2-40B4-BE49-F238E27FC236}">
+                <a16:creationId xmlns:a16="http://schemas.microsoft.com/office/drawing/2014/main" id="{652A8FAD-A3EB-4651-9CA0-6D433B025F94}"/>
+              </a:ext>
+            </a:extLst>
+          </p:cNvPr>
+          <p:cNvSpPr>
+            <a:spLocks noGrp="1"/>
+          </p:cNvSpPr>
+          <p:nvPr>
+            <p:ph idx="1"/>
+          </p:nvPr>
+        </p:nvSpPr>
+        <p:spPr>
+          <a:xfrm>
+            <a:off x="685801" y="1378589"/>
+            <a:ext cx="10668739" cy="3663928"/>
+          </a:xfrm>
+        </p:spPr>
+        <p:txBody>
+          <a:bodyPr>
+            <a:normAutofit fontScale="92500"/>
+          </a:bodyPr>
+          <a:lstStyle/>
+          <a:p>
+            <a:r>
+              <a:rPr lang="en-CA" sz="1800" dirty="0">
+                <a:effectLst/>
+                <a:latin typeface="Calibri" panose="020F0502020204030204" pitchFamily="34" charset="0"/>
+              </a:rPr>
+              <a:t>Create feature branch for your ticket through the DevOps web portal.</a:t>
+            </a:r>
+          </a:p>
+          <a:p>
+            <a:r>
+              <a:rPr lang="en-CA" sz="1800" dirty="0">
+                <a:effectLst/>
+                <a:latin typeface="Calibri" panose="020F0502020204030204" pitchFamily="34" charset="0"/>
+              </a:rPr>
+              <a:t>The branch should be made off of the parent ticket – PBI, bug or chore, </a:t>
+            </a:r>
+            <a:r>
+              <a:rPr lang="en-CA" sz="1800" i="1" dirty="0">
+                <a:effectLst/>
+                <a:latin typeface="Calibri" panose="020F0502020204030204" pitchFamily="34" charset="0"/>
+              </a:rPr>
+              <a:t>not task. </a:t>
+            </a:r>
+          </a:p>
+          <a:p>
+            <a:r>
+              <a:rPr lang="en-CA" sz="1800" dirty="0">
+                <a:effectLst/>
+                <a:latin typeface="Calibri" panose="020F0502020204030204" pitchFamily="34" charset="0"/>
+              </a:rPr>
+              <a:t>If you need a </a:t>
+            </a:r>
+            <a:r>
+              <a:rPr lang="en-CA" sz="1800" dirty="0" err="1">
+                <a:effectLst/>
+                <a:latin typeface="Calibri" panose="020F0502020204030204" pitchFamily="34" charset="0"/>
+              </a:rPr>
+              <a:t>db</a:t>
+            </a:r>
+            <a:r>
+              <a:rPr lang="en-CA" sz="1800" dirty="0">
+                <a:effectLst/>
+                <a:latin typeface="Calibri" panose="020F0502020204030204" pitchFamily="34" charset="0"/>
+              </a:rPr>
+              <a:t>, restore a </a:t>
+            </a:r>
+            <a:r>
+              <a:rPr lang="en-CA" sz="1800" dirty="0" err="1">
+                <a:effectLst/>
+                <a:latin typeface="Calibri" panose="020F0502020204030204" pitchFamily="34" charset="0"/>
+              </a:rPr>
+              <a:t>bu</a:t>
+            </a:r>
+            <a:r>
+              <a:rPr lang="en-CA" sz="1800" dirty="0">
+                <a:effectLst/>
+                <a:latin typeface="Calibri" panose="020F0502020204030204" pitchFamily="34" charset="0"/>
+              </a:rPr>
+              <a:t>, </a:t>
+            </a:r>
+            <a:r>
+              <a:rPr lang="en-CA" sz="1800" i="1" dirty="0">
+                <a:effectLst/>
+                <a:latin typeface="Calibri" panose="020F0502020204030204" pitchFamily="34" charset="0"/>
+              </a:rPr>
+              <a:t>make sure you have that branch checked out</a:t>
+            </a:r>
+            <a:r>
+              <a:rPr lang="en-CA" sz="1800" dirty="0">
+                <a:effectLst/>
+                <a:latin typeface="Calibri" panose="020F0502020204030204" pitchFamily="34" charset="0"/>
+              </a:rPr>
+              <a:t> and 'link to source control'</a:t>
+            </a:r>
+          </a:p>
+          <a:p>
+            <a:r>
+              <a:rPr lang="en-CA" sz="1800" dirty="0">
+                <a:effectLst/>
+                <a:latin typeface="Calibri" panose="020F0502020204030204" pitchFamily="34" charset="0"/>
+              </a:rPr>
+              <a:t>When you commit changes in </a:t>
+            </a:r>
+            <a:r>
+              <a:rPr lang="en-CA" sz="1800" dirty="0" err="1">
+                <a:effectLst/>
+                <a:latin typeface="Calibri" panose="020F0502020204030204" pitchFamily="34" charset="0"/>
+              </a:rPr>
+              <a:t>ssms</a:t>
+            </a:r>
+            <a:r>
+              <a:rPr lang="en-CA" sz="1800" dirty="0">
+                <a:effectLst/>
+                <a:latin typeface="Calibri" panose="020F0502020204030204" pitchFamily="34" charset="0"/>
+              </a:rPr>
+              <a:t>, don't push from there, in case there are other commits. You can't see them in SSMS, use VS or another tool to push exactly what you want to push.</a:t>
+            </a:r>
+          </a:p>
+          <a:p>
+            <a:r>
+              <a:rPr lang="en-CA" sz="1800" dirty="0">
+                <a:effectLst/>
+                <a:latin typeface="Calibri" panose="020F0502020204030204" pitchFamily="34" charset="0"/>
+              </a:rPr>
+              <a:t>Once all commits are pushed, submit pull request through the DevOps web portal. Don't do it with VS, it doesn't always link to the ticket.</a:t>
+            </a:r>
+          </a:p>
+          <a:p>
+            <a:r>
+              <a:rPr lang="en-CA" sz="1800" dirty="0">
+                <a:effectLst/>
+                <a:latin typeface="Calibri" panose="020F0502020204030204" pitchFamily="34" charset="0"/>
+              </a:rPr>
+              <a:t>When you’re creating pull request, you must look through all the files and changes before submitting.  Make sure you submitting exactly what you mean to.</a:t>
+            </a:r>
+          </a:p>
+          <a:p>
+            <a:r>
+              <a:rPr lang="en-CA" sz="1800" dirty="0">
+                <a:effectLst/>
+                <a:latin typeface="Calibri" panose="020F0502020204030204" pitchFamily="34" charset="0"/>
+              </a:rPr>
+              <a:t>When completing pull request, delete branch. Decide if you want to complete the associated work item (checkbox).</a:t>
+            </a:r>
+          </a:p>
+          <a:p>
+            <a:pPr marL="0" indent="0">
+              <a:buNone/>
+            </a:pPr>
+            <a:endParaRPr lang="en-CA" dirty="0"/>
+          </a:p>
+        </p:txBody>
+      </p:sp>
+    </p:spTree>
+    <p:extLst>
+      <p:ext uri="{BB962C8B-B14F-4D97-AF65-F5344CB8AC3E}">
+        <p14:creationId xmlns:p14="http://schemas.microsoft.com/office/powerpoint/2010/main" val="2669859729"/>
       </p:ext>
     </p:extLst>
   </p:cSld>

</xml_diff>